<commit_message>
Add more pilot background
</commit_message>
<xml_diff>
--- a/2020/ECP/slides/01-Overview.pptx
+++ b/2020/ECP/slides/01-Overview.pptx
@@ -5,19 +5,20 @@
     <p:sldMasterId id="2147483935" r:id="rId4"/>
   </p:sldMasterIdLst>
   <p:notesMasterIdLst>
-    <p:notesMasterId r:id="rId12"/>
+    <p:notesMasterId r:id="rId13"/>
   </p:notesMasterIdLst>
   <p:handoutMasterIdLst>
-    <p:handoutMasterId r:id="rId13"/>
+    <p:handoutMasterId r:id="rId14"/>
   </p:handoutMasterIdLst>
   <p:sldIdLst>
     <p:sldId id="385" r:id="rId5"/>
     <p:sldId id="404" r:id="rId6"/>
-    <p:sldId id="405" r:id="rId7"/>
-    <p:sldId id="420" r:id="rId8"/>
+    <p:sldId id="258" r:id="rId7"/>
+    <p:sldId id="257" r:id="rId8"/>
     <p:sldId id="406" r:id="rId9"/>
-    <p:sldId id="407" r:id="rId10"/>
-    <p:sldId id="393" r:id="rId11"/>
+    <p:sldId id="420" r:id="rId10"/>
+    <p:sldId id="407" r:id="rId11"/>
+    <p:sldId id="393" r:id="rId12"/>
   </p:sldIdLst>
   <p:sldSz cx="12188825" cy="6858000"/>
   <p:notesSz cx="7010400" cy="9296400"/>
@@ -267,7 +268,7 @@
           <a:p>
             <a:fld id="{0B842F42-2CE9-4E35-95C1-410DC08A50B1}" type="datetimeFigureOut">
               <a:rPr lang="en-US" smtClean="0"/>
-              <a:t>1/28/20</a:t>
+              <a:t>2/3/20</a:t>
             </a:fld>
             <a:endParaRPr lang="en-US"/>
           </a:p>
@@ -432,7 +433,7 @@
           <a:p>
             <a:fld id="{6F282904-F315-4730-8D91-37D99E141A6F}" type="datetimeFigureOut">
               <a:rPr lang="en-US" smtClean="0"/>
-              <a:t>1/28/20</a:t>
+              <a:t>2/3/20</a:t>
             </a:fld>
             <a:endParaRPr lang="en-US"/>
           </a:p>
@@ -2289,6 +2290,177 @@
 </p:sldLayout>
 </file>
 
+<file path=ppt/slideLayouts/slideLayout7.xml><?xml version="1.0" encoding="utf-8"?>
+<p:sldLayout xmlns:a="http://schemas.openxmlformats.org/drawingml/2006/main" xmlns:r="http://schemas.openxmlformats.org/officeDocument/2006/relationships" xmlns:p="http://schemas.openxmlformats.org/presentationml/2006/main" userDrawn="1">
+  <p:cSld name="1_Title and Content">
+    <p:spTree>
+      <p:nvGrpSpPr>
+        <p:cNvPr id="1" name=""/>
+        <p:cNvGrpSpPr/>
+        <p:nvPr/>
+      </p:nvGrpSpPr>
+      <p:grpSpPr>
+        <a:xfrm>
+          <a:off x="0" y="0"/>
+          <a:ext cx="0" cy="0"/>
+          <a:chOff x="0" y="0"/>
+          <a:chExt cx="0" cy="0"/>
+        </a:xfrm>
+      </p:grpSpPr>
+      <p:sp>
+        <p:nvSpPr>
+          <p:cNvPr id="2" name="Title 1"/>
+          <p:cNvSpPr>
+            <a:spLocks noGrp="1"/>
+          </p:cNvSpPr>
+          <p:nvPr>
+            <p:ph type="title"/>
+          </p:nvPr>
+        </p:nvSpPr>
+        <p:spPr>
+          <a:xfrm>
+            <a:off x="429655" y="274320"/>
+            <a:ext cx="11427023" cy="539496"/>
+          </a:xfrm>
+        </p:spPr>
+        <p:txBody>
+          <a:bodyPr/>
+          <a:lstStyle>
+            <a:lvl1pPr>
+              <a:lnSpc>
+                <a:spcPct val="90000"/>
+              </a:lnSpc>
+              <a:defRPr sz="3199"/>
+            </a:lvl1pPr>
+          </a:lstStyle>
+          <a:p>
+            <a:r>
+              <a:rPr lang="en-US"/>
+              <a:t>Click to edit Master title style</a:t>
+            </a:r>
+            <a:endParaRPr lang="en-US" dirty="0"/>
+          </a:p>
+        </p:txBody>
+      </p:sp>
+      <p:sp>
+        <p:nvSpPr>
+          <p:cNvPr id="3" name="Content Placeholder 2"/>
+          <p:cNvSpPr>
+            <a:spLocks noGrp="1"/>
+          </p:cNvSpPr>
+          <p:nvPr>
+            <p:ph idx="1"/>
+          </p:nvPr>
+        </p:nvSpPr>
+        <p:spPr>
+          <a:xfrm>
+            <a:off x="447939" y="1653735"/>
+            <a:ext cx="11427023" cy="4047778"/>
+          </a:xfrm>
+        </p:spPr>
+        <p:txBody>
+          <a:bodyPr/>
+          <a:lstStyle>
+            <a:lvl1pPr marL="288838" indent="-288838">
+              <a:spcBef>
+                <a:spcPts val="1799"/>
+              </a:spcBef>
+              <a:buClr>
+                <a:schemeClr val="tx1"/>
+              </a:buClr>
+              <a:buSzPct val="90000"/>
+              <a:buFont typeface="Century Gothic" panose="020B0502020202020204" pitchFamily="34" charset="0"/>
+              <a:buChar char="•"/>
+              <a:defRPr lang="en-US" sz="2799" kern="1200" dirty="0">
+                <a:solidFill>
+                  <a:schemeClr val="tx1"/>
+                </a:solidFill>
+                <a:latin typeface="Century Gothic" panose="020B0502020202020204" pitchFamily="34" charset="0"/>
+                <a:ea typeface="+mn-ea"/>
+                <a:cs typeface="+mn-cs"/>
+              </a:defRPr>
+            </a:lvl1pPr>
+            <a:lvl2pPr marL="687182" indent="-288838">
+              <a:buClr>
+                <a:schemeClr val="tx1"/>
+              </a:buClr>
+              <a:buSzPct val="90000"/>
+              <a:buFont typeface="Century Gothic" panose="020B0502020202020204" pitchFamily="34" charset="0"/>
+              <a:buChar char="–"/>
+              <a:defRPr>
+                <a:latin typeface="+mn-lt"/>
+                <a:cs typeface="Arial" panose="020B0604020202020204" pitchFamily="34" charset="0"/>
+              </a:defRPr>
+            </a:lvl2pPr>
+            <a:lvl3pPr marL="1031565" indent="-288838">
+              <a:buClr>
+                <a:schemeClr val="tx1"/>
+              </a:buClr>
+              <a:buSzPct val="90000"/>
+              <a:buFont typeface="Century Gothic" panose="020B0502020202020204" pitchFamily="34" charset="0"/>
+              <a:buChar char="•"/>
+              <a:defRPr>
+                <a:latin typeface="+mn-lt"/>
+                <a:cs typeface="Arial" panose="020B0604020202020204" pitchFamily="34" charset="0"/>
+              </a:defRPr>
+            </a:lvl3pPr>
+            <a:lvl4pPr>
+              <a:buClr>
+                <a:schemeClr val="tx1"/>
+              </a:buClr>
+              <a:defRPr>
+                <a:latin typeface="+mn-lt"/>
+                <a:cs typeface="Arial" panose="020B0604020202020204" pitchFamily="34" charset="0"/>
+              </a:defRPr>
+            </a:lvl4pPr>
+            <a:lvl5pPr marL="1482280" indent="-222183">
+              <a:buClr>
+                <a:schemeClr val="tx1"/>
+              </a:buClr>
+              <a:buFont typeface="Arial" panose="020B0604020202020204" pitchFamily="34" charset="0"/>
+              <a:buChar char="•"/>
+              <a:defRPr>
+                <a:latin typeface="+mn-lt"/>
+                <a:cs typeface="Arial" panose="020B0604020202020204" pitchFamily="34" charset="0"/>
+              </a:defRPr>
+            </a:lvl5pPr>
+          </a:lstStyle>
+          <a:p>
+            <a:pPr lvl="0"/>
+            <a:r>
+              <a:rPr lang="en-US"/>
+              <a:t>Click to edit Master text styles</a:t>
+            </a:r>
+          </a:p>
+          <a:p>
+            <a:pPr lvl="1"/>
+            <a:r>
+              <a:rPr lang="en-US"/>
+              <a:t>Second level</a:t>
+            </a:r>
+          </a:p>
+          <a:p>
+            <a:pPr lvl="2"/>
+            <a:r>
+              <a:rPr lang="en-US"/>
+              <a:t>Third level</a:t>
+            </a:r>
+          </a:p>
+        </p:txBody>
+      </p:sp>
+    </p:spTree>
+    <p:extLst>
+      <p:ext uri="{BB962C8B-B14F-4D97-AF65-F5344CB8AC3E}">
+        <p14:creationId xmlns:p14="http://schemas.microsoft.com/office/powerpoint/2010/main" val="3367769303"/>
+      </p:ext>
+    </p:extLst>
+  </p:cSld>
+  <p:clrMapOvr>
+    <a:masterClrMapping/>
+  </p:clrMapOvr>
+</p:sldLayout>
+</file>
+
 <file path=ppt/slideMasters/slideMaster1.xml><?xml version="1.0" encoding="utf-8"?>
 <p:sldMaster xmlns:a="http://schemas.openxmlformats.org/drawingml/2006/main" xmlns:r="http://schemas.openxmlformats.org/officeDocument/2006/relationships" xmlns:p="http://schemas.openxmlformats.org/presentationml/2006/main" preserve="1">
   <p:cSld>
@@ -2437,7 +2609,7 @@
           <p:nvPr userDrawn="1"/>
         </p:nvPicPr>
         <p:blipFill>
-          <a:blip r:embed="rId8" cstate="print">
+          <a:blip r:embed="rId9" cstate="print">
             <a:extLst>
               <a:ext uri="{28A0092B-C50C-407E-A947-70E740481C1C}">
                 <a14:useLocalDpi xmlns:a14="http://schemas.microsoft.com/office/drawing/2010/main"/>
@@ -2737,6 +2909,7 @@
     <p:sldLayoutId id="2147483940" r:id="rId4"/>
     <p:sldLayoutId id="2147483950" r:id="rId5"/>
     <p:sldLayoutId id="2147483941" r:id="rId6"/>
+    <p:sldLayoutId id="2147483951" r:id="rId7"/>
   </p:sldLayoutIdLst>
   <p:hf hdr="0" ftr="0" dt="0"/>
   <p:txStyles>
@@ -3501,7 +3674,7 @@
           <p:cNvPr id="2" name="Title 1">
             <a:extLst>
               <a:ext uri="{FF2B5EF4-FFF2-40B4-BE49-F238E27FC236}">
-                <a16:creationId xmlns:a16="http://schemas.microsoft.com/office/drawing/2014/main" id="{D40BF1D8-B53E-6546-9019-F8E98F00E2A7}"/>
+                <a16:creationId xmlns:a16="http://schemas.microsoft.com/office/drawing/2014/main" id="{19B6CABB-1E04-7746-8240-2A983CB75686}"/>
               </a:ext>
             </a:extLst>
           </p:cNvPr>
@@ -3519,7 +3692,7 @@
           <a:p>
             <a:r>
               <a:rPr lang="en-US" dirty="0"/>
-              <a:t>Background</a:t>
+              <a:t>CANDLE Background</a:t>
             </a:r>
           </a:p>
         </p:txBody>
@@ -3529,7 +3702,7 @@
           <p:cNvPr id="3" name="Content Placeholder 2">
             <a:extLst>
               <a:ext uri="{FF2B5EF4-FFF2-40B4-BE49-F238E27FC236}">
-                <a16:creationId xmlns:a16="http://schemas.microsoft.com/office/drawing/2014/main" id="{C7BD6F05-45FC-BA40-BA22-FD994C306877}"/>
+                <a16:creationId xmlns:a16="http://schemas.microsoft.com/office/drawing/2014/main" id="{42EB0E77-6039-9F46-89B8-58AADF9E5FA8}"/>
               </a:ext>
             </a:extLst>
           </p:cNvPr>
@@ -3540,7 +3713,12 @@
             <p:ph idx="1"/>
           </p:nvPr>
         </p:nvSpPr>
-        <p:spPr/>
+        <p:spPr>
+          <a:xfrm>
+            <a:off x="447938" y="1230283"/>
+            <a:ext cx="11427023" cy="4470638"/>
+          </a:xfrm>
+        </p:spPr>
         <p:txBody>
           <a:bodyPr/>
           <a:lstStyle/>
@@ -3561,6 +3739,13 @@
             <a:pPr lvl="1"/>
             <a:r>
               <a:rPr lang="en-US" dirty="0"/>
+              <a:t>Cancer Moonshot &amp; National Strategic Computing Initiative</a:t>
+            </a:r>
+          </a:p>
+          <a:p>
+            <a:pPr lvl="1"/>
+            <a:r>
+              <a:rPr lang="en-US" dirty="0"/>
               <a:t>ANL, LLNL, LANL, ORNL, and Fredrick National Lab for Cancer Research</a:t>
             </a:r>
           </a:p>
@@ -3569,93 +3754,568 @@
             <a:endParaRPr lang="en-US" dirty="0"/>
           </a:p>
           <a:p>
+            <a:r>
+              <a:rPr lang="en-US" dirty="0"/>
+              <a:t>Accelerate precision oncology capabilities</a:t>
+            </a:r>
+          </a:p>
+          <a:p>
             <a:pPr lvl="1"/>
             <a:r>
               <a:rPr lang="en-US" dirty="0"/>
-              <a:t>3 multi-disciplinary cancer-focused pilot projects</a:t>
+              <a:t>3 application-focused pilots</a:t>
+            </a:r>
+          </a:p>
+          <a:p>
+            <a:pPr lvl="1"/>
+            <a:r>
+              <a:rPr lang="en-US" dirty="0"/>
+              <a:t>2 cross-cutting initiatives</a:t>
             </a:r>
           </a:p>
           <a:p>
             <a:pPr lvl="2"/>
             <a:r>
               <a:rPr lang="en-US" dirty="0"/>
-              <a:t>Molecular level</a:t>
+              <a:t>Uncertainty quantification</a:t>
             </a:r>
           </a:p>
           <a:p>
             <a:pPr lvl="2"/>
             <a:r>
               <a:rPr lang="en-US" dirty="0"/>
-              <a:t>Cellular level</a:t>
-            </a:r>
-          </a:p>
-          <a:p>
-            <a:pPr lvl="2"/>
-            <a:r>
-              <a:rPr lang="en-US" dirty="0"/>
-              <a:t>Population level</a:t>
-            </a:r>
-          </a:p>
-          <a:p>
-            <a:pPr lvl="1"/>
-            <a:r>
-              <a:rPr lang="en-US" dirty="0"/>
-              <a:t>Uncertainty quantification</a:t>
-            </a:r>
-          </a:p>
-          <a:p>
-            <a:pPr lvl="1"/>
-            <a:r>
-              <a:rPr lang="en-US" dirty="0" err="1"/>
-              <a:t>CANcer</a:t>
-            </a:r>
-            <a:r>
-              <a:rPr lang="en-US" dirty="0"/>
-              <a:t> Distributed Learning Environment (CANDLE)</a:t>
+              <a:t>Scalable deep learning (CANDLE)</a:t>
             </a:r>
           </a:p>
         </p:txBody>
       </p:sp>
-      <p:pic>
-        <p:nvPicPr>
-          <p:cNvPr id="5" name="Picture 4">
+      <p:grpSp>
+        <p:nvGrpSpPr>
+          <p:cNvPr id="5" name="Group 4">
             <a:extLst>
               <a:ext uri="{FF2B5EF4-FFF2-40B4-BE49-F238E27FC236}">
-                <a16:creationId xmlns:a16="http://schemas.microsoft.com/office/drawing/2014/main" id="{9AD494AF-E677-9646-BE5E-1CD2773145A5}"/>
+                <a16:creationId xmlns:a16="http://schemas.microsoft.com/office/drawing/2014/main" id="{26CF981E-70AE-254A-BC76-5CD382147C0E}"/>
               </a:ext>
             </a:extLst>
           </p:cNvPr>
-          <p:cNvPicPr>
-            <a:picLocks noChangeAspect="1"/>
-          </p:cNvPicPr>
+          <p:cNvGrpSpPr/>
           <p:nvPr/>
-        </p:nvPicPr>
-        <p:blipFill>
-          <a:blip r:embed="rId2">
-            <a:extLst>
-              <a:ext uri="{28A0092B-C50C-407E-A947-70E740481C1C}">
-                <a14:useLocalDpi xmlns:a14="http://schemas.microsoft.com/office/drawing/2010/main" val="0"/>
-              </a:ext>
-            </a:extLst>
-          </a:blip>
-          <a:stretch>
-            <a:fillRect/>
-          </a:stretch>
-        </p:blipFill>
-        <p:spPr>
+        </p:nvGrpSpPr>
+        <p:grpSpPr>
           <a:xfrm>
-            <a:off x="8180481" y="2785243"/>
-            <a:ext cx="3642584" cy="3108872"/>
+            <a:off x="8424276" y="3085705"/>
+            <a:ext cx="3684472" cy="2877043"/>
+            <a:chOff x="1288312" y="2503505"/>
+            <a:chExt cx="3014674" cy="2235058"/>
           </a:xfrm>
-          <a:prstGeom prst="rect">
-            <a:avLst/>
-          </a:prstGeom>
-        </p:spPr>
-      </p:pic>
+        </p:grpSpPr>
+        <p:sp>
+          <p:nvSpPr>
+            <p:cNvPr id="6" name="Curved Down Arrow 5">
+              <a:extLst>
+                <a:ext uri="{FF2B5EF4-FFF2-40B4-BE49-F238E27FC236}">
+                  <a16:creationId xmlns:a16="http://schemas.microsoft.com/office/drawing/2014/main" id="{6A6129BA-7253-904D-9490-7592BFD0C29B}"/>
+                </a:ext>
+              </a:extLst>
+            </p:cNvPr>
+            <p:cNvSpPr/>
+            <p:nvPr/>
+          </p:nvSpPr>
+          <p:spPr>
+            <a:xfrm rot="19782540" flipH="1" flipV="1">
+              <a:off x="2554390" y="4075905"/>
+              <a:ext cx="1738320" cy="662658"/>
+            </a:xfrm>
+            <a:prstGeom prst="curvedDownArrow">
+              <a:avLst>
+                <a:gd name="adj1" fmla="val 38218"/>
+                <a:gd name="adj2" fmla="val 78800"/>
+                <a:gd name="adj3" fmla="val 54762"/>
+              </a:avLst>
+            </a:prstGeom>
+            <a:solidFill>
+              <a:schemeClr val="bg1">
+                <a:lumMod val="75000"/>
+              </a:schemeClr>
+            </a:solidFill>
+            <a:ln>
+              <a:noFill/>
+            </a:ln>
+          </p:spPr>
+          <p:style>
+            <a:lnRef idx="2">
+              <a:schemeClr val="accent1">
+                <a:shade val="50000"/>
+              </a:schemeClr>
+            </a:lnRef>
+            <a:fillRef idx="1">
+              <a:schemeClr val="accent1"/>
+            </a:fillRef>
+            <a:effectRef idx="0">
+              <a:schemeClr val="accent1"/>
+            </a:effectRef>
+            <a:fontRef idx="minor">
+              <a:schemeClr val="lt1"/>
+            </a:fontRef>
+          </p:style>
+          <p:txBody>
+            <a:bodyPr rtlCol="0" anchor="ctr"/>
+            <a:lstStyle/>
+            <a:p>
+              <a:pPr algn="ctr" defTabSz="913656"/>
+              <a:endParaRPr lang="en-US" dirty="0">
+                <a:solidFill>
+                  <a:prstClr val="black"/>
+                </a:solidFill>
+                <a:latin typeface="Calibri"/>
+              </a:endParaRPr>
+            </a:p>
+          </p:txBody>
+        </p:sp>
+        <p:sp>
+          <p:nvSpPr>
+            <p:cNvPr id="7" name="Curved Down Arrow 6">
+              <a:extLst>
+                <a:ext uri="{FF2B5EF4-FFF2-40B4-BE49-F238E27FC236}">
+                  <a16:creationId xmlns:a16="http://schemas.microsoft.com/office/drawing/2014/main" id="{B2549499-85B9-534D-86BE-ECA9D4A690D2}"/>
+                </a:ext>
+              </a:extLst>
+            </p:cNvPr>
+            <p:cNvSpPr/>
+            <p:nvPr/>
+          </p:nvSpPr>
+          <p:spPr>
+            <a:xfrm rot="19782540">
+              <a:off x="1342768" y="2503505"/>
+              <a:ext cx="1696113" cy="662658"/>
+            </a:xfrm>
+            <a:prstGeom prst="curvedDownArrow">
+              <a:avLst>
+                <a:gd name="adj1" fmla="val 38218"/>
+                <a:gd name="adj2" fmla="val 78800"/>
+                <a:gd name="adj3" fmla="val 54762"/>
+              </a:avLst>
+            </a:prstGeom>
+            <a:solidFill>
+              <a:schemeClr val="bg1">
+                <a:lumMod val="75000"/>
+              </a:schemeClr>
+            </a:solidFill>
+            <a:ln>
+              <a:noFill/>
+            </a:ln>
+          </p:spPr>
+          <p:style>
+            <a:lnRef idx="2">
+              <a:schemeClr val="accent1">
+                <a:shade val="50000"/>
+              </a:schemeClr>
+            </a:lnRef>
+            <a:fillRef idx="1">
+              <a:schemeClr val="accent1"/>
+            </a:fillRef>
+            <a:effectRef idx="0">
+              <a:schemeClr val="accent1"/>
+            </a:effectRef>
+            <a:fontRef idx="minor">
+              <a:schemeClr val="lt1"/>
+            </a:fontRef>
+          </p:style>
+          <p:txBody>
+            <a:bodyPr rtlCol="0" anchor="ctr"/>
+            <a:lstStyle/>
+            <a:p>
+              <a:pPr algn="ctr" defTabSz="913656"/>
+              <a:endParaRPr lang="en-US" dirty="0">
+                <a:solidFill>
+                  <a:prstClr val="black"/>
+                </a:solidFill>
+                <a:latin typeface="Calibri"/>
+              </a:endParaRPr>
+            </a:p>
+          </p:txBody>
+        </p:sp>
+        <p:grpSp>
+          <p:nvGrpSpPr>
+            <p:cNvPr id="8" name="Group 7">
+              <a:extLst>
+                <a:ext uri="{FF2B5EF4-FFF2-40B4-BE49-F238E27FC236}">
+                  <a16:creationId xmlns:a16="http://schemas.microsoft.com/office/drawing/2014/main" id="{D27FD672-260B-5F4E-9485-233831514320}"/>
+                </a:ext>
+              </a:extLst>
+            </p:cNvPr>
+            <p:cNvGrpSpPr/>
+            <p:nvPr/>
+          </p:nvGrpSpPr>
+          <p:grpSpPr>
+            <a:xfrm>
+              <a:off x="1288312" y="2533195"/>
+              <a:ext cx="3014674" cy="2151381"/>
+              <a:chOff x="5029199" y="3416300"/>
+              <a:chExt cx="3352801" cy="2392682"/>
+            </a:xfrm>
+          </p:grpSpPr>
+          <p:sp>
+            <p:nvSpPr>
+              <p:cNvPr id="11" name="Hexagon 10">
+                <a:extLst>
+                  <a:ext uri="{FF2B5EF4-FFF2-40B4-BE49-F238E27FC236}">
+                    <a16:creationId xmlns:a16="http://schemas.microsoft.com/office/drawing/2014/main" id="{4EDC6DFB-E07A-1D4B-AF48-016E12EF0990}"/>
+                  </a:ext>
+                </a:extLst>
+              </p:cNvPr>
+              <p:cNvSpPr/>
+              <p:nvPr/>
+            </p:nvSpPr>
+            <p:spPr>
+              <a:xfrm>
+                <a:off x="6553200" y="3416300"/>
+                <a:ext cx="1828800" cy="1554480"/>
+              </a:xfrm>
+              <a:prstGeom prst="hexagon">
+                <a:avLst/>
+              </a:prstGeom>
+              <a:solidFill>
+                <a:srgbClr val="C00000"/>
+              </a:solidFill>
+              <a:ln>
+                <a:noFill/>
+              </a:ln>
+            </p:spPr>
+            <p:style>
+              <a:lnRef idx="1">
+                <a:schemeClr val="accent1"/>
+              </a:lnRef>
+              <a:fillRef idx="3">
+                <a:schemeClr val="accent1"/>
+              </a:fillRef>
+              <a:effectRef idx="2">
+                <a:schemeClr val="accent1"/>
+              </a:effectRef>
+              <a:fontRef idx="minor">
+                <a:schemeClr val="lt1"/>
+              </a:fontRef>
+            </p:style>
+            <p:txBody>
+              <a:bodyPr lIns="0" tIns="45693" rIns="0" bIns="45693" rtlCol="0" anchor="ctr"/>
+              <a:lstStyle/>
+              <a:p>
+                <a:pPr algn="ctr" defTabSz="913656"/>
+                <a:r>
+                  <a:rPr lang="en-US" sz="2399" b="1" dirty="0">
+                    <a:solidFill>
+                      <a:prstClr val="white"/>
+                    </a:solidFill>
+                    <a:effectLst>
+                      <a:outerShdw blurRad="50800" dist="38100" dir="5400000" algn="t" rotWithShape="0">
+                        <a:prstClr val="black">
+                          <a:alpha val="40000"/>
+                        </a:prstClr>
+                      </a:outerShdw>
+                    </a:effectLst>
+                    <a:latin typeface="Calibri"/>
+                  </a:rPr>
+                  <a:t>NCI</a:t>
+                </a:r>
+              </a:p>
+              <a:p>
+                <a:pPr algn="ctr" defTabSz="913656"/>
+                <a:r>
+                  <a:rPr lang="en-US" dirty="0">
+                    <a:solidFill>
+                      <a:prstClr val="white"/>
+                    </a:solidFill>
+                    <a:latin typeface="Calibri"/>
+                  </a:rPr>
+                  <a:t>National </a:t>
+                </a:r>
+                <a:br>
+                  <a:rPr lang="en-US" dirty="0">
+                    <a:solidFill>
+                      <a:prstClr val="white"/>
+                    </a:solidFill>
+                    <a:latin typeface="Calibri"/>
+                  </a:rPr>
+                </a:br>
+                <a:r>
+                  <a:rPr lang="en-US" dirty="0">
+                    <a:solidFill>
+                      <a:prstClr val="white"/>
+                    </a:solidFill>
+                    <a:latin typeface="Calibri"/>
+                  </a:rPr>
+                  <a:t>Cancer </a:t>
+                </a:r>
+                <a:br>
+                  <a:rPr lang="en-US" dirty="0">
+                    <a:solidFill>
+                      <a:prstClr val="white"/>
+                    </a:solidFill>
+                    <a:latin typeface="Calibri"/>
+                  </a:rPr>
+                </a:br>
+                <a:r>
+                  <a:rPr lang="en-US" dirty="0">
+                    <a:solidFill>
+                      <a:prstClr val="white"/>
+                    </a:solidFill>
+                    <a:latin typeface="Calibri"/>
+                  </a:rPr>
+                  <a:t>Institute</a:t>
+                </a:r>
+              </a:p>
+            </p:txBody>
+          </p:sp>
+          <p:sp>
+            <p:nvSpPr>
+              <p:cNvPr id="12" name="Hexagon 11">
+                <a:extLst>
+                  <a:ext uri="{FF2B5EF4-FFF2-40B4-BE49-F238E27FC236}">
+                    <a16:creationId xmlns:a16="http://schemas.microsoft.com/office/drawing/2014/main" id="{2B605868-5BDD-AD48-8FBE-E39DAF2AC870}"/>
+                  </a:ext>
+                </a:extLst>
+              </p:cNvPr>
+              <p:cNvSpPr/>
+              <p:nvPr/>
+            </p:nvSpPr>
+            <p:spPr>
+              <a:xfrm>
+                <a:off x="5029199" y="4254502"/>
+                <a:ext cx="1828800" cy="1554480"/>
+              </a:xfrm>
+              <a:prstGeom prst="hexagon">
+                <a:avLst/>
+              </a:prstGeom>
+              <a:solidFill>
+                <a:srgbClr val="69BE28"/>
+              </a:solidFill>
+              <a:ln/>
+            </p:spPr>
+            <p:style>
+              <a:lnRef idx="1">
+                <a:schemeClr val="accent3"/>
+              </a:lnRef>
+              <a:fillRef idx="3">
+                <a:schemeClr val="accent3"/>
+              </a:fillRef>
+              <a:effectRef idx="2">
+                <a:schemeClr val="accent3"/>
+              </a:effectRef>
+              <a:fontRef idx="minor">
+                <a:schemeClr val="lt1"/>
+              </a:fontRef>
+            </p:style>
+            <p:txBody>
+              <a:bodyPr lIns="0" tIns="45693" rIns="0" bIns="0" rtlCol="0" anchor="ctr"/>
+              <a:lstStyle/>
+              <a:p>
+                <a:pPr algn="ctr" defTabSz="913656"/>
+                <a:r>
+                  <a:rPr lang="en-US" sz="2399" b="1" dirty="0">
+                    <a:solidFill>
+                      <a:prstClr val="white"/>
+                    </a:solidFill>
+                    <a:effectLst>
+                      <a:outerShdw blurRad="50800" dist="38100" dir="5400000" algn="t" rotWithShape="0">
+                        <a:prstClr val="black">
+                          <a:alpha val="40000"/>
+                        </a:prstClr>
+                      </a:outerShdw>
+                    </a:effectLst>
+                    <a:latin typeface="Calibri"/>
+                  </a:rPr>
+                  <a:t>DOE</a:t>
+                </a:r>
+              </a:p>
+              <a:p>
+                <a:pPr algn="ctr" defTabSz="913656"/>
+                <a:r>
+                  <a:rPr lang="en-US" dirty="0">
+                    <a:solidFill>
+                      <a:prstClr val="white"/>
+                    </a:solidFill>
+                    <a:latin typeface="Calibri"/>
+                  </a:rPr>
+                  <a:t>Department</a:t>
+                </a:r>
+              </a:p>
+              <a:p>
+                <a:pPr algn="ctr" defTabSz="913656"/>
+                <a:r>
+                  <a:rPr lang="en-US" dirty="0">
+                    <a:solidFill>
+                      <a:prstClr val="white"/>
+                    </a:solidFill>
+                    <a:latin typeface="Calibri"/>
+                  </a:rPr>
+                  <a:t>of Energy</a:t>
+                </a:r>
+              </a:p>
+              <a:p>
+                <a:pPr algn="ctr" defTabSz="913656"/>
+                <a:endParaRPr lang="en-US" sz="1100" dirty="0">
+                  <a:solidFill>
+                    <a:prstClr val="white"/>
+                  </a:solidFill>
+                  <a:latin typeface="Calibri"/>
+                </a:endParaRPr>
+              </a:p>
+            </p:txBody>
+          </p:sp>
+        </p:grpSp>
+        <p:sp>
+          <p:nvSpPr>
+            <p:cNvPr id="9" name="Rectangle 8">
+              <a:extLst>
+                <a:ext uri="{FF2B5EF4-FFF2-40B4-BE49-F238E27FC236}">
+                  <a16:creationId xmlns:a16="http://schemas.microsoft.com/office/drawing/2014/main" id="{BF16306F-0499-8044-BB7C-04A5BCD95E1C}"/>
+                </a:ext>
+              </a:extLst>
+            </p:cNvPr>
+            <p:cNvSpPr/>
+            <p:nvPr/>
+          </p:nvSpPr>
+          <p:spPr>
+            <a:xfrm>
+              <a:off x="2938837" y="3919582"/>
+              <a:ext cx="908960" cy="501978"/>
+            </a:xfrm>
+            <a:prstGeom prst="rect">
+              <a:avLst/>
+            </a:prstGeom>
+          </p:spPr>
+          <p:txBody>
+            <a:bodyPr wrap="none">
+              <a:spAutoFit/>
+            </a:bodyPr>
+            <a:lstStyle/>
+            <a:p>
+              <a:pPr algn="ctr" defTabSz="913656"/>
+              <a:r>
+                <a:rPr lang="en-US" sz="1200" dirty="0">
+                  <a:solidFill>
+                    <a:prstClr val="black"/>
+                  </a:solidFill>
+                  <a:latin typeface="Calibri"/>
+                </a:rPr>
+                <a:t>Cancer driving </a:t>
+              </a:r>
+              <a:br>
+                <a:rPr lang="en-US" sz="1200" dirty="0">
+                  <a:solidFill>
+                    <a:prstClr val="black"/>
+                  </a:solidFill>
+                  <a:latin typeface="Calibri"/>
+                </a:rPr>
+              </a:br>
+              <a:r>
+                <a:rPr lang="en-US" sz="1200" dirty="0">
+                  <a:solidFill>
+                    <a:prstClr val="black"/>
+                  </a:solidFill>
+                  <a:latin typeface="Calibri"/>
+                </a:rPr>
+                <a:t>computing </a:t>
+              </a:r>
+              <a:br>
+                <a:rPr lang="en-US" sz="1200" dirty="0">
+                  <a:solidFill>
+                    <a:prstClr val="black"/>
+                  </a:solidFill>
+                  <a:latin typeface="Calibri"/>
+                </a:rPr>
+              </a:br>
+              <a:r>
+                <a:rPr lang="en-US" sz="1200" dirty="0">
+                  <a:solidFill>
+                    <a:prstClr val="black"/>
+                  </a:solidFill>
+                  <a:latin typeface="Calibri"/>
+                </a:rPr>
+                <a:t>advances</a:t>
+              </a:r>
+            </a:p>
+          </p:txBody>
+        </p:sp>
+        <p:sp>
+          <p:nvSpPr>
+            <p:cNvPr id="10" name="Rectangle 9">
+              <a:extLst>
+                <a:ext uri="{FF2B5EF4-FFF2-40B4-BE49-F238E27FC236}">
+                  <a16:creationId xmlns:a16="http://schemas.microsoft.com/office/drawing/2014/main" id="{15BD04A5-3486-6E48-A5C6-8BE1B116AF45}"/>
+                </a:ext>
+              </a:extLst>
+            </p:cNvPr>
+            <p:cNvSpPr/>
+            <p:nvPr/>
+          </p:nvSpPr>
+          <p:spPr>
+            <a:xfrm>
+              <a:off x="1814420" y="2675557"/>
+              <a:ext cx="865951" cy="501978"/>
+            </a:xfrm>
+            <a:prstGeom prst="rect">
+              <a:avLst/>
+            </a:prstGeom>
+          </p:spPr>
+          <p:txBody>
+            <a:bodyPr wrap="none">
+              <a:spAutoFit/>
+            </a:bodyPr>
+            <a:lstStyle/>
+            <a:p>
+              <a:pPr algn="ctr" defTabSz="913656"/>
+              <a:r>
+                <a:rPr lang="en-US" sz="1200" dirty="0">
+                  <a:solidFill>
+                    <a:prstClr val="black"/>
+                  </a:solidFill>
+                  <a:latin typeface="Calibri"/>
+                </a:rPr>
+                <a:t>Computing</a:t>
+              </a:r>
+              <a:br>
+                <a:rPr lang="en-US" sz="1200" dirty="0">
+                  <a:solidFill>
+                    <a:prstClr val="black"/>
+                  </a:solidFill>
+                  <a:latin typeface="Calibri"/>
+                </a:rPr>
+              </a:br>
+              <a:r>
+                <a:rPr lang="en-US" sz="1200" dirty="0">
+                  <a:solidFill>
+                    <a:prstClr val="black"/>
+                  </a:solidFill>
+                  <a:latin typeface="Calibri"/>
+                </a:rPr>
+                <a:t>driving cancer</a:t>
+              </a:r>
+              <a:br>
+                <a:rPr lang="en-US" sz="1200" dirty="0">
+                  <a:solidFill>
+                    <a:prstClr val="black"/>
+                  </a:solidFill>
+                  <a:latin typeface="Calibri"/>
+                </a:rPr>
+              </a:br>
+              <a:r>
+                <a:rPr lang="en-US" sz="1200" dirty="0">
+                  <a:solidFill>
+                    <a:prstClr val="black"/>
+                  </a:solidFill>
+                  <a:latin typeface="Calibri"/>
+                </a:rPr>
+                <a:t>advances</a:t>
+              </a:r>
+            </a:p>
+          </p:txBody>
+        </p:sp>
+      </p:grpSp>
     </p:spTree>
     <p:extLst>
       <p:ext uri="{BB962C8B-B14F-4D97-AF65-F5344CB8AC3E}">
-        <p14:creationId xmlns:p14="http://schemas.microsoft.com/office/powerpoint/2010/main" val="2042118168"/>
+        <p14:creationId xmlns:p14="http://schemas.microsoft.com/office/powerpoint/2010/main" val="1667435180"/>
       </p:ext>
     </p:extLst>
   </p:cSld>
@@ -3687,7 +4347,7 @@
           <p:cNvPr id="2" name="Title 1">
             <a:extLst>
               <a:ext uri="{FF2B5EF4-FFF2-40B4-BE49-F238E27FC236}">
-                <a16:creationId xmlns:a16="http://schemas.microsoft.com/office/drawing/2014/main" id="{8F3FA2AD-6F1D-6C4D-B5CB-D3DF710D3D8E}"/>
+                <a16:creationId xmlns:a16="http://schemas.microsoft.com/office/drawing/2014/main" id="{19B6CABB-1E04-7746-8240-2A983CB75686}"/>
               </a:ext>
             </a:extLst>
           </p:cNvPr>
@@ -3705,7 +4365,7 @@
           <a:p>
             <a:r>
               <a:rPr lang="en-US" dirty="0"/>
-              <a:t>Project Goals	</a:t>
+              <a:t>JDACS4C Pilots</a:t>
             </a:r>
           </a:p>
         </p:txBody>
@@ -3715,7 +4375,7 @@
           <p:cNvPr id="3" name="Content Placeholder 2">
             <a:extLst>
               <a:ext uri="{FF2B5EF4-FFF2-40B4-BE49-F238E27FC236}">
-                <a16:creationId xmlns:a16="http://schemas.microsoft.com/office/drawing/2014/main" id="{FDCCBF8A-8C06-6F49-8028-A0202F7EBA88}"/>
+                <a16:creationId xmlns:a16="http://schemas.microsoft.com/office/drawing/2014/main" id="{42EB0E77-6039-9F46-89B8-58AADF9E5FA8}"/>
               </a:ext>
             </a:extLst>
           </p:cNvPr>
@@ -3726,76 +4386,140 @@
             <p:ph idx="1"/>
           </p:nvPr>
         </p:nvSpPr>
-        <p:spPr/>
+        <p:spPr>
+          <a:xfrm>
+            <a:off x="447938" y="1230283"/>
+            <a:ext cx="11427023" cy="4470638"/>
+          </a:xfrm>
+        </p:spPr>
         <p:txBody>
           <a:bodyPr/>
           <a:lstStyle/>
           <a:p>
             <a:r>
               <a:rPr lang="en-US" dirty="0"/>
-              <a:t>Provide API for deep learning on DOE supercomputers</a:t>
+              <a:t>Pilot 1: Pre-clinical models</a:t>
             </a:r>
           </a:p>
           <a:p>
             <a:pPr lvl="1"/>
             <a:r>
               <a:rPr lang="en-US" dirty="0"/>
-              <a:t>CANDLE Library</a:t>
+              <a:t>Predictive patient drug response models</a:t>
             </a:r>
           </a:p>
           <a:p>
             <a:pPr lvl="1"/>
             <a:r>
               <a:rPr lang="en-US" dirty="0"/>
-              <a:t>Facilitate dependencies, IO, UQ, visualization, profiling</a:t>
-            </a:r>
-          </a:p>
-          <a:p>
-            <a:r>
-              <a:rPr lang="en-US" dirty="0"/>
-              <a:t>Support general set of deep learning workflows</a:t>
+              <a:t>PI: Rick Stevens (ANL)</a:t>
+            </a:r>
+          </a:p>
+          <a:p>
+            <a:r>
+              <a:rPr lang="en-US" dirty="0"/>
+              <a:t>Pilot 2: Biological models</a:t>
             </a:r>
           </a:p>
           <a:p>
             <a:pPr lvl="1"/>
             <a:r>
               <a:rPr lang="en-US" dirty="0"/>
-              <a:t>CANDLE Supervisor</a:t>
+              <a:t>Multi-scale computational biological models</a:t>
             </a:r>
           </a:p>
           <a:p>
             <a:pPr lvl="1"/>
             <a:r>
               <a:rPr lang="en-US" dirty="0"/>
-              <a:t>Portable across DOE computing platforms</a:t>
-            </a:r>
-          </a:p>
-          <a:p>
-            <a:r>
-              <a:rPr lang="en-US" dirty="0"/>
-              <a:t>Produce optimized models for CORAL2 systems</a:t>
+              <a:t>PI: Fred </a:t>
+            </a:r>
+            <a:r>
+              <a:rPr lang="en-US" dirty="0" err="1"/>
+              <a:t>Streitz</a:t>
+            </a:r>
+            <a:r>
+              <a:rPr lang="en-US" dirty="0"/>
+              <a:t> (LLNL)</a:t>
+            </a:r>
+          </a:p>
+          <a:p>
+            <a:r>
+              <a:rPr lang="en-US" dirty="0"/>
+              <a:t>Pilot 3: Cancer Surveillance</a:t>
             </a:r>
           </a:p>
           <a:p>
             <a:pPr lvl="1"/>
             <a:r>
               <a:rPr lang="en-US" dirty="0"/>
-              <a:t>CANDLE Benchmarks</a:t>
+              <a:t>Insight into factors impact clinical response</a:t>
             </a:r>
           </a:p>
           <a:p>
             <a:pPr lvl="1"/>
             <a:r>
               <a:rPr lang="en-US" dirty="0"/>
-              <a:t>Pilot-based deep learning models</a:t>
+              <a:t>PI: Gina </a:t>
+            </a:r>
+            <a:r>
+              <a:rPr lang="en-US" dirty="0" err="1"/>
+              <a:t>Tourassi</a:t>
+            </a:r>
+            <a:r>
+              <a:rPr lang="en-US" dirty="0"/>
+              <a:t> (ORNL)</a:t>
             </a:r>
           </a:p>
         </p:txBody>
       </p:sp>
+      <p:pic>
+        <p:nvPicPr>
+          <p:cNvPr id="4" name="Picture 3">
+            <a:extLst>
+              <a:ext uri="{FF2B5EF4-FFF2-40B4-BE49-F238E27FC236}">
+                <a16:creationId xmlns:a16="http://schemas.microsoft.com/office/drawing/2014/main" id="{48BE4F2B-54D0-9A4F-9D98-6B66F1AF88BA}"/>
+              </a:ext>
+            </a:extLst>
+          </p:cNvPr>
+          <p:cNvPicPr>
+            <a:picLocks noChangeAspect="1"/>
+          </p:cNvPicPr>
+          <p:nvPr/>
+        </p:nvPicPr>
+        <p:blipFill>
+          <a:blip r:embed="rId2">
+            <a:extLst>
+              <a:ext uri="{28A0092B-C50C-407E-A947-70E740481C1C}">
+                <a14:useLocalDpi xmlns:a14="http://schemas.microsoft.com/office/drawing/2010/main" val="0"/>
+              </a:ext>
+            </a:extLst>
+          </a:blip>
+          <a:stretch>
+            <a:fillRect/>
+          </a:stretch>
+        </p:blipFill>
+        <p:spPr>
+          <a:xfrm>
+            <a:off x="7700888" y="1949849"/>
+            <a:ext cx="4386768" cy="3031506"/>
+          </a:xfrm>
+          <a:prstGeom prst="rect">
+            <a:avLst/>
+          </a:prstGeom>
+          <a:effectLst>
+            <a:outerShdw blurRad="50800" dist="38100" dir="2700000" algn="tl" rotWithShape="0">
+              <a:prstClr val="black">
+                <a:alpha val="40000"/>
+              </a:prstClr>
+            </a:outerShdw>
+          </a:effectLst>
+        </p:spPr>
+      </p:pic>
     </p:spTree>
     <p:extLst>
       <p:ext uri="{BB962C8B-B14F-4D97-AF65-F5344CB8AC3E}">
-        <p14:creationId xmlns:p14="http://schemas.microsoft.com/office/powerpoint/2010/main" val="1327185159"/>
+        <p14:creationId xmlns:p14="http://schemas.microsoft.com/office/powerpoint/2010/main" val="1821930206"/>
       </p:ext>
     </p:extLst>
   </p:cSld>
@@ -3920,6 +4644,146 @@
           <p:cNvPr id="2" name="Title 1">
             <a:extLst>
               <a:ext uri="{FF2B5EF4-FFF2-40B4-BE49-F238E27FC236}">
+                <a16:creationId xmlns:a16="http://schemas.microsoft.com/office/drawing/2014/main" id="{8F3FA2AD-6F1D-6C4D-B5CB-D3DF710D3D8E}"/>
+              </a:ext>
+            </a:extLst>
+          </p:cNvPr>
+          <p:cNvSpPr>
+            <a:spLocks noGrp="1"/>
+          </p:cNvSpPr>
+          <p:nvPr>
+            <p:ph type="title"/>
+          </p:nvPr>
+        </p:nvSpPr>
+        <p:spPr/>
+        <p:txBody>
+          <a:bodyPr/>
+          <a:lstStyle/>
+          <a:p>
+            <a:r>
+              <a:rPr lang="en-US" dirty="0"/>
+              <a:t>Project Goals	</a:t>
+            </a:r>
+          </a:p>
+        </p:txBody>
+      </p:sp>
+      <p:sp>
+        <p:nvSpPr>
+          <p:cNvPr id="3" name="Content Placeholder 2">
+            <a:extLst>
+              <a:ext uri="{FF2B5EF4-FFF2-40B4-BE49-F238E27FC236}">
+                <a16:creationId xmlns:a16="http://schemas.microsoft.com/office/drawing/2014/main" id="{FDCCBF8A-8C06-6F49-8028-A0202F7EBA88}"/>
+              </a:ext>
+            </a:extLst>
+          </p:cNvPr>
+          <p:cNvSpPr>
+            <a:spLocks noGrp="1"/>
+          </p:cNvSpPr>
+          <p:nvPr>
+            <p:ph idx="1"/>
+          </p:nvPr>
+        </p:nvSpPr>
+        <p:spPr/>
+        <p:txBody>
+          <a:bodyPr/>
+          <a:lstStyle/>
+          <a:p>
+            <a:r>
+              <a:rPr lang="en-US" dirty="0"/>
+              <a:t>Provide API for deep learning on DOE supercomputers</a:t>
+            </a:r>
+          </a:p>
+          <a:p>
+            <a:pPr lvl="1"/>
+            <a:r>
+              <a:rPr lang="en-US" dirty="0"/>
+              <a:t>CANDLE Library</a:t>
+            </a:r>
+          </a:p>
+          <a:p>
+            <a:pPr lvl="1"/>
+            <a:r>
+              <a:rPr lang="en-US" dirty="0"/>
+              <a:t>Facilitate dependencies, IO, UQ, visualization, profiling</a:t>
+            </a:r>
+          </a:p>
+          <a:p>
+            <a:r>
+              <a:rPr lang="en-US" dirty="0"/>
+              <a:t>Support general set of deep learning workflows</a:t>
+            </a:r>
+          </a:p>
+          <a:p>
+            <a:pPr lvl="1"/>
+            <a:r>
+              <a:rPr lang="en-US" dirty="0"/>
+              <a:t>CANDLE Supervisor</a:t>
+            </a:r>
+          </a:p>
+          <a:p>
+            <a:pPr lvl="1"/>
+            <a:r>
+              <a:rPr lang="en-US" dirty="0"/>
+              <a:t>Portable across DOE computing platforms</a:t>
+            </a:r>
+          </a:p>
+          <a:p>
+            <a:r>
+              <a:rPr lang="en-US" dirty="0"/>
+              <a:t>Produce example proxy application models for vendors and users</a:t>
+            </a:r>
+          </a:p>
+          <a:p>
+            <a:pPr lvl="1"/>
+            <a:r>
+              <a:rPr lang="en-US" dirty="0"/>
+              <a:t>CANDLE Benchmarks</a:t>
+            </a:r>
+          </a:p>
+          <a:p>
+            <a:pPr lvl="1"/>
+            <a:r>
+              <a:rPr lang="en-US" dirty="0"/>
+              <a:t>Pilot-based deep learning models</a:t>
+            </a:r>
+          </a:p>
+        </p:txBody>
+      </p:sp>
+    </p:spTree>
+    <p:extLst>
+      <p:ext uri="{BB962C8B-B14F-4D97-AF65-F5344CB8AC3E}">
+        <p14:creationId xmlns:p14="http://schemas.microsoft.com/office/powerpoint/2010/main" val="1327185159"/>
+      </p:ext>
+    </p:extLst>
+  </p:cSld>
+  <p:clrMapOvr>
+    <a:masterClrMapping/>
+  </p:clrMapOvr>
+</p:sld>
+</file>
+
+<file path=ppt/slides/slide7.xml><?xml version="1.0" encoding="utf-8"?>
+<p:sld xmlns:a="http://schemas.openxmlformats.org/drawingml/2006/main" xmlns:r="http://schemas.openxmlformats.org/officeDocument/2006/relationships" xmlns:p="http://schemas.openxmlformats.org/presentationml/2006/main">
+  <p:cSld>
+    <p:spTree>
+      <p:nvGrpSpPr>
+        <p:cNvPr id="1" name=""/>
+        <p:cNvGrpSpPr/>
+        <p:nvPr/>
+      </p:nvGrpSpPr>
+      <p:grpSpPr>
+        <a:xfrm>
+          <a:off x="0" y="0"/>
+          <a:ext cx="0" cy="0"/>
+          <a:chOff x="0" y="0"/>
+          <a:chExt cx="0" cy="0"/>
+        </a:xfrm>
+      </p:grpSpPr>
+      <p:sp>
+        <p:nvSpPr>
+          <p:cNvPr id="2" name="Title 1">
+            <a:extLst>
+              <a:ext uri="{FF2B5EF4-FFF2-40B4-BE49-F238E27FC236}">
                 <a16:creationId xmlns:a16="http://schemas.microsoft.com/office/drawing/2014/main" id="{97BE5B12-2487-2F4F-A275-FF81242A5B98}"/>
               </a:ext>
             </a:extLst>
@@ -4060,7 +4924,7 @@
 </p:sld>
 </file>
 
-<file path=ppt/slides/slide7.xml><?xml version="1.0" encoding="utf-8"?>
+<file path=ppt/slides/slide8.xml><?xml version="1.0" encoding="utf-8"?>
 <p:sld xmlns:a="http://schemas.openxmlformats.org/drawingml/2006/main" xmlns:r="http://schemas.openxmlformats.org/officeDocument/2006/relationships" xmlns:p="http://schemas.openxmlformats.org/presentationml/2006/main">
   <p:cSld>
     <p:spTree>
@@ -5140,6 +6004,15 @@
 </file>
 
 <file path=customXml/item1.xml><?xml version="1.0" encoding="utf-8"?>
+<?mso-contentType ?>
+<FormTemplates xmlns="http://schemas.microsoft.com/sharepoint/v3/contenttype/forms">
+  <Display>DocumentLibraryForm</Display>
+  <Edit>DocumentLibraryForm</Edit>
+  <New>DocumentLibraryForm</New>
+</FormTemplates>
+</file>
+
+<file path=customXml/item2.xml><?xml version="1.0" encoding="utf-8"?>
 <ct:contentTypeSchema xmlns:ct="http://schemas.microsoft.com/office/2006/metadata/contentType" xmlns:ma="http://schemas.microsoft.com/office/2006/metadata/properties/metaAttributes" ct:_="" ma:_="" ma:contentTypeName="Document" ma:contentTypeID="0x010100693156C96291C349BBF8B640319D465D" ma:contentTypeVersion="0" ma:contentTypeDescription="Create a new document." ma:contentTypeScope="" ma:versionID="8a71be8d30b42e8e74cf70a4a4cbda4c">
   <xsd:schema xmlns:xsd="http://www.w3.org/2001/XMLSchema" xmlns:p="http://schemas.microsoft.com/office/2006/metadata/properties" targetNamespace="http://schemas.microsoft.com/office/2006/metadata/properties" ma:root="true" ma:fieldsID="4aeb20c0e3442673af7ee10786458764">
     <xsd:element name="properties">
@@ -5188,15 +6061,6 @@
 </ct:contentTypeSchema>
 </file>
 
-<file path=customXml/item2.xml><?xml version="1.0" encoding="utf-8"?>
-<?mso-contentType ?>
-<FormTemplates xmlns="http://schemas.microsoft.com/sharepoint/v3/contenttype/forms">
-  <Display>DocumentLibraryForm</Display>
-  <Edit>DocumentLibraryForm</Edit>
-  <New>DocumentLibraryForm</New>
-</FormTemplates>
-</file>
-
 <file path=customXml/item3.xml><?xml version="1.0" encoding="utf-8"?>
 <p:properties xmlns:p="http://schemas.microsoft.com/office/2006/metadata/properties" xmlns:xsi="http://www.w3.org/2001/XMLSchema-instance" xmlns:pc="http://schemas.microsoft.com/office/infopath/2007/PartnerControls">
   <documentManagement/>
@@ -5204,6 +6068,14 @@
 </file>
 
 <file path=customXml/itemProps1.xml><?xml version="1.0" encoding="utf-8"?>
+<ds:datastoreItem xmlns:ds="http://schemas.openxmlformats.org/officeDocument/2006/customXml" ds:itemID="{19E20559-B232-4371-8690-E3D8007EDB82}">
+  <ds:schemaRefs>
+    <ds:schemaRef ds:uri="http://schemas.microsoft.com/sharepoint/v3/contenttype/forms"/>
+  </ds:schemaRefs>
+</ds:datastoreItem>
+</file>
+
+<file path=customXml/itemProps2.xml><?xml version="1.0" encoding="utf-8"?>
 <ds:datastoreItem xmlns:ds="http://schemas.openxmlformats.org/officeDocument/2006/customXml" ds:itemID="{D85F602D-FF92-4BDD-B4C2-093468CCF754}">
   <ds:schemaRefs>
     <ds:schemaRef ds:uri="http://schemas.microsoft.com/office/2006/metadata/contentType"/>
@@ -5214,14 +6086,6 @@
     <ds:schemaRef ds:uri="http://purl.org/dc/elements/1.1/"/>
     <ds:schemaRef ds:uri="http://purl.org/dc/terms/"/>
     <ds:schemaRef ds:uri="http://schemas.microsoft.com/office/internal/2005/internalDocumentation"/>
-  </ds:schemaRefs>
-</ds:datastoreItem>
-</file>
-
-<file path=customXml/itemProps2.xml><?xml version="1.0" encoding="utf-8"?>
-<ds:datastoreItem xmlns:ds="http://schemas.openxmlformats.org/officeDocument/2006/customXml" ds:itemID="{19E20559-B232-4371-8690-E3D8007EDB82}">
-  <ds:schemaRefs>
-    <ds:schemaRef ds:uri="http://schemas.microsoft.com/sharepoint/v3/contenttype/forms"/>
   </ds:schemaRefs>
 </ds:datastoreItem>
 </file>

</xml_diff>

<commit_message>
Add team slide to overview
</commit_message>
<xml_diff>
--- a/2020/ECP/slides/01-Overview.pptx
+++ b/2020/ECP/slides/01-Overview.pptx
@@ -5,20 +5,21 @@
     <p:sldMasterId id="2147483935" r:id="rId4"/>
   </p:sldMasterIdLst>
   <p:notesMasterIdLst>
-    <p:notesMasterId r:id="rId13"/>
+    <p:notesMasterId r:id="rId14"/>
   </p:notesMasterIdLst>
   <p:handoutMasterIdLst>
-    <p:handoutMasterId r:id="rId14"/>
+    <p:handoutMasterId r:id="rId15"/>
   </p:handoutMasterIdLst>
   <p:sldIdLst>
     <p:sldId id="385" r:id="rId5"/>
     <p:sldId id="404" r:id="rId6"/>
     <p:sldId id="258" r:id="rId7"/>
     <p:sldId id="257" r:id="rId8"/>
-    <p:sldId id="406" r:id="rId9"/>
-    <p:sldId id="420" r:id="rId10"/>
-    <p:sldId id="407" r:id="rId11"/>
-    <p:sldId id="393" r:id="rId12"/>
+    <p:sldId id="421" r:id="rId9"/>
+    <p:sldId id="406" r:id="rId10"/>
+    <p:sldId id="420" r:id="rId11"/>
+    <p:sldId id="407" r:id="rId12"/>
+    <p:sldId id="393" r:id="rId13"/>
   </p:sldIdLst>
   <p:sldSz cx="12188825" cy="6858000"/>
   <p:notesSz cx="7010400" cy="9296400"/>
@@ -268,7 +269,7 @@
           <a:p>
             <a:fld id="{0B842F42-2CE9-4E35-95C1-410DC08A50B1}" type="datetimeFigureOut">
               <a:rPr lang="en-US" smtClean="0"/>
-              <a:t>2/3/20</a:t>
+              <a:t>2/4/20</a:t>
             </a:fld>
             <a:endParaRPr lang="en-US"/>
           </a:p>
@@ -433,7 +434,7 @@
           <a:p>
             <a:fld id="{6F282904-F315-4730-8D91-37D99E141A6F}" type="datetimeFigureOut">
               <a:rPr lang="en-US" smtClean="0"/>
-              <a:t>2/3/20</a:t>
+              <a:t>2/4/20</a:t>
             </a:fld>
             <a:endParaRPr lang="en-US"/>
           </a:p>
@@ -4551,6 +4552,344 @@
           <p:cNvPr id="2" name="Title 1">
             <a:extLst>
               <a:ext uri="{FF2B5EF4-FFF2-40B4-BE49-F238E27FC236}">
+                <a16:creationId xmlns:a16="http://schemas.microsoft.com/office/drawing/2014/main" id="{7E5DD610-8739-F64D-8DE4-FB4706211CF5}"/>
+              </a:ext>
+            </a:extLst>
+          </p:cNvPr>
+          <p:cNvSpPr>
+            <a:spLocks noGrp="1"/>
+          </p:cNvSpPr>
+          <p:nvPr>
+            <p:ph type="title"/>
+          </p:nvPr>
+        </p:nvSpPr>
+        <p:spPr/>
+        <p:txBody>
+          <a:bodyPr/>
+          <a:lstStyle/>
+          <a:p>
+            <a:r>
+              <a:rPr lang="en-US" dirty="0"/>
+              <a:t>Team</a:t>
+            </a:r>
+          </a:p>
+        </p:txBody>
+      </p:sp>
+      <p:sp>
+        <p:nvSpPr>
+          <p:cNvPr id="3" name="Content Placeholder 2">
+            <a:extLst>
+              <a:ext uri="{FF2B5EF4-FFF2-40B4-BE49-F238E27FC236}">
+                <a16:creationId xmlns:a16="http://schemas.microsoft.com/office/drawing/2014/main" id="{B00E7DEB-4E0E-1B44-B2B5-E86BE2FEE3DD}"/>
+              </a:ext>
+            </a:extLst>
+          </p:cNvPr>
+          <p:cNvSpPr>
+            <a:spLocks noGrp="1"/>
+          </p:cNvSpPr>
+          <p:nvPr>
+            <p:ph idx="1"/>
+          </p:nvPr>
+        </p:nvSpPr>
+        <p:spPr>
+          <a:xfrm>
+            <a:off x="447939" y="945931"/>
+            <a:ext cx="11427023" cy="4755582"/>
+          </a:xfrm>
+        </p:spPr>
+        <p:txBody>
+          <a:bodyPr numCol="3"/>
+          <a:lstStyle/>
+          <a:p>
+            <a:r>
+              <a:rPr lang="en-US" sz="2400" dirty="0"/>
+              <a:t>Argonne</a:t>
+            </a:r>
+          </a:p>
+          <a:p>
+            <a:pPr lvl="1"/>
+            <a:r>
+              <a:rPr lang="en-US" sz="2000" dirty="0"/>
+              <a:t>Tom </a:t>
+            </a:r>
+            <a:r>
+              <a:rPr lang="en-US" sz="2000" dirty="0" err="1"/>
+              <a:t>Brettin</a:t>
+            </a:r>
+            <a:endParaRPr lang="en-US" sz="2000" dirty="0"/>
+          </a:p>
+          <a:p>
+            <a:pPr lvl="1"/>
+            <a:r>
+              <a:rPr lang="en-US" sz="2000" dirty="0"/>
+              <a:t>Nick Collier</a:t>
+            </a:r>
+          </a:p>
+          <a:p>
+            <a:pPr lvl="1"/>
+            <a:r>
+              <a:rPr lang="en-US" sz="2000" dirty="0"/>
+              <a:t>Rajeev Jain</a:t>
+            </a:r>
+          </a:p>
+          <a:p>
+            <a:pPr lvl="1"/>
+            <a:r>
+              <a:rPr lang="en-US" sz="2000" dirty="0"/>
+              <a:t>Jonathan </a:t>
+            </a:r>
+            <a:r>
+              <a:rPr lang="en-US" sz="2000" dirty="0" err="1"/>
+              <a:t>Ozik</a:t>
+            </a:r>
+            <a:endParaRPr lang="en-US" sz="2000" dirty="0"/>
+          </a:p>
+          <a:p>
+            <a:pPr lvl="1"/>
+            <a:r>
+              <a:rPr lang="en-US" sz="2000" dirty="0"/>
+              <a:t>Arvind Ramanathan</a:t>
+            </a:r>
+          </a:p>
+          <a:p>
+            <a:pPr lvl="1"/>
+            <a:r>
+              <a:rPr lang="en-US" sz="2000" dirty="0"/>
+              <a:t>Rick Stevens</a:t>
+            </a:r>
+          </a:p>
+          <a:p>
+            <a:pPr lvl="1"/>
+            <a:r>
+              <a:rPr lang="en-US" sz="2000" dirty="0"/>
+              <a:t>Justin Wozniak</a:t>
+            </a:r>
+          </a:p>
+          <a:p>
+            <a:pPr lvl="1"/>
+            <a:r>
+              <a:rPr lang="en-US" sz="2000" dirty="0"/>
+              <a:t>Fangfang Xia</a:t>
+            </a:r>
+          </a:p>
+          <a:p>
+            <a:pPr lvl="1"/>
+            <a:r>
+              <a:rPr lang="en-US" sz="2000" dirty="0"/>
+              <a:t>Harry </a:t>
+            </a:r>
+            <a:r>
+              <a:rPr lang="en-US" sz="2000" dirty="0" err="1"/>
+              <a:t>Yoo</a:t>
+            </a:r>
+            <a:endParaRPr lang="en-US" sz="2000" dirty="0"/>
+          </a:p>
+          <a:p>
+            <a:pPr lvl="1"/>
+            <a:r>
+              <a:rPr lang="en-US" sz="2000" dirty="0"/>
+              <a:t>…</a:t>
+            </a:r>
+          </a:p>
+          <a:p>
+            <a:pPr marL="0" indent="0">
+              <a:buNone/>
+            </a:pPr>
+            <a:endParaRPr lang="en-US" sz="2000" dirty="0"/>
+          </a:p>
+          <a:p>
+            <a:r>
+              <a:rPr lang="en-US" sz="2400" dirty="0"/>
+              <a:t>Fredrick</a:t>
+            </a:r>
+          </a:p>
+          <a:p>
+            <a:pPr lvl="1"/>
+            <a:r>
+              <a:rPr lang="en-US" sz="2000" dirty="0"/>
+              <a:t>Andrew Weisman</a:t>
+            </a:r>
+          </a:p>
+          <a:p>
+            <a:pPr lvl="1"/>
+            <a:r>
+              <a:rPr lang="en-US" sz="2000" dirty="0"/>
+              <a:t>George </a:t>
+            </a:r>
+            <a:r>
+              <a:rPr lang="en-US" sz="2000" dirty="0" err="1"/>
+              <a:t>Zaki</a:t>
+            </a:r>
+            <a:endParaRPr lang="en-US" sz="2000" dirty="0"/>
+          </a:p>
+          <a:p>
+            <a:pPr lvl="1"/>
+            <a:r>
+              <a:rPr lang="en-US" sz="2000" dirty="0"/>
+              <a:t>…</a:t>
+            </a:r>
+          </a:p>
+          <a:p>
+            <a:endParaRPr lang="en-US" sz="2400" dirty="0"/>
+          </a:p>
+          <a:p>
+            <a:r>
+              <a:rPr lang="en-US" sz="2400" dirty="0"/>
+              <a:t>Livermore</a:t>
+            </a:r>
+          </a:p>
+          <a:p>
+            <a:pPr lvl="1"/>
+            <a:r>
+              <a:rPr lang="en-US" sz="2000" dirty="0"/>
+              <a:t>Brian van Essen</a:t>
+            </a:r>
+          </a:p>
+          <a:p>
+            <a:pPr lvl="1"/>
+            <a:r>
+              <a:rPr lang="en-US" sz="2000" dirty="0"/>
+              <a:t>Sam Ade Jacobs</a:t>
+            </a:r>
+          </a:p>
+          <a:p>
+            <a:pPr lvl="1"/>
+            <a:r>
+              <a:rPr lang="en-US" sz="2000" dirty="0"/>
+              <a:t>Adam Moody</a:t>
+            </a:r>
+          </a:p>
+          <a:p>
+            <a:pPr lvl="1"/>
+            <a:r>
+              <a:rPr lang="en-US" sz="2000" dirty="0"/>
+              <a:t>…</a:t>
+            </a:r>
+          </a:p>
+          <a:p>
+            <a:endParaRPr lang="en-US" sz="2000" dirty="0"/>
+          </a:p>
+          <a:p>
+            <a:r>
+              <a:rPr lang="en-US" sz="2400" dirty="0"/>
+              <a:t>Los Alamos</a:t>
+            </a:r>
+          </a:p>
+          <a:p>
+            <a:pPr lvl="1"/>
+            <a:r>
+              <a:rPr lang="en-US" sz="2000" dirty="0"/>
+              <a:t>Christina Garcia-Cardona</a:t>
+            </a:r>
+          </a:p>
+          <a:p>
+            <a:pPr lvl="1"/>
+            <a:r>
+              <a:rPr lang="en-US" sz="2000" dirty="0"/>
+              <a:t>Jamal </a:t>
+            </a:r>
+            <a:r>
+              <a:rPr lang="en-US" sz="2000" dirty="0" err="1"/>
+              <a:t>Mohd</a:t>
+            </a:r>
+            <a:r>
+              <a:rPr lang="en-US" sz="2000" dirty="0"/>
+              <a:t> Yusof</a:t>
+            </a:r>
+          </a:p>
+          <a:p>
+            <a:pPr lvl="1"/>
+            <a:r>
+              <a:rPr lang="en-US" sz="2000" dirty="0"/>
+              <a:t>…</a:t>
+            </a:r>
+          </a:p>
+          <a:p>
+            <a:endParaRPr lang="en-US" sz="2400" dirty="0"/>
+          </a:p>
+          <a:p>
+            <a:r>
+              <a:rPr lang="en-US" sz="2400" dirty="0"/>
+              <a:t>Oak Ridge</a:t>
+            </a:r>
+          </a:p>
+          <a:p>
+            <a:pPr lvl="1"/>
+            <a:r>
+              <a:rPr lang="en-US" sz="2000" dirty="0"/>
+              <a:t>Shang Gao</a:t>
+            </a:r>
+          </a:p>
+          <a:p>
+            <a:pPr lvl="1"/>
+            <a:r>
+              <a:rPr lang="en-US" sz="2000" dirty="0"/>
+              <a:t>John </a:t>
+            </a:r>
+            <a:r>
+              <a:rPr lang="en-US" sz="2000" dirty="0" err="1"/>
+              <a:t>Gounley</a:t>
+            </a:r>
+            <a:endParaRPr lang="en-US" sz="2000" dirty="0"/>
+          </a:p>
+          <a:p>
+            <a:pPr lvl="1"/>
+            <a:r>
+              <a:rPr lang="en-US" sz="2000" dirty="0"/>
+              <a:t>Hong-Jun Yoon</a:t>
+            </a:r>
+          </a:p>
+          <a:p>
+            <a:pPr lvl="1"/>
+            <a:r>
+              <a:rPr lang="en-US" sz="2000" dirty="0"/>
+              <a:t>Todd Young</a:t>
+            </a:r>
+          </a:p>
+          <a:p>
+            <a:pPr lvl="1"/>
+            <a:r>
+              <a:rPr lang="en-US" sz="2000" dirty="0"/>
+              <a:t>…</a:t>
+            </a:r>
+          </a:p>
+        </p:txBody>
+      </p:sp>
+    </p:spTree>
+    <p:extLst>
+      <p:ext uri="{BB962C8B-B14F-4D97-AF65-F5344CB8AC3E}">
+        <p14:creationId xmlns:p14="http://schemas.microsoft.com/office/powerpoint/2010/main" val="2843925311"/>
+      </p:ext>
+    </p:extLst>
+  </p:cSld>
+  <p:clrMapOvr>
+    <a:masterClrMapping/>
+  </p:clrMapOvr>
+</p:sld>
+</file>
+
+<file path=ppt/slides/slide6.xml><?xml version="1.0" encoding="utf-8"?>
+<p:sld xmlns:a="http://schemas.openxmlformats.org/drawingml/2006/main" xmlns:r="http://schemas.openxmlformats.org/officeDocument/2006/relationships" xmlns:p="http://schemas.openxmlformats.org/presentationml/2006/main">
+  <p:cSld>
+    <p:spTree>
+      <p:nvGrpSpPr>
+        <p:cNvPr id="1" name=""/>
+        <p:cNvGrpSpPr/>
+        <p:nvPr/>
+      </p:nvGrpSpPr>
+      <p:grpSpPr>
+        <a:xfrm>
+          <a:off x="0" y="0"/>
+          <a:ext cx="0" cy="0"/>
+          <a:chOff x="0" y="0"/>
+          <a:chExt cx="0" cy="0"/>
+        </a:xfrm>
+      </p:grpSpPr>
+      <p:sp>
+        <p:nvSpPr>
+          <p:cNvPr id="2" name="Title 1">
+            <a:extLst>
+              <a:ext uri="{FF2B5EF4-FFF2-40B4-BE49-F238E27FC236}">
                 <a16:creationId xmlns:a16="http://schemas.microsoft.com/office/drawing/2014/main" id="{F74349D5-BF35-AC46-B9F0-7D39B9D980D0}"/>
               </a:ext>
             </a:extLst>
@@ -4622,7 +4961,7 @@
 </p:sld>
 </file>
 
-<file path=ppt/slides/slide6.xml><?xml version="1.0" encoding="utf-8"?>
+<file path=ppt/slides/slide7.xml><?xml version="1.0" encoding="utf-8"?>
 <p:sld xmlns:a="http://schemas.openxmlformats.org/drawingml/2006/main" xmlns:r="http://schemas.openxmlformats.org/officeDocument/2006/relationships" xmlns:p="http://schemas.openxmlformats.org/presentationml/2006/main">
   <p:cSld>
     <p:spTree>
@@ -4762,7 +5101,7 @@
 </p:sld>
 </file>
 
-<file path=ppt/slides/slide7.xml><?xml version="1.0" encoding="utf-8"?>
+<file path=ppt/slides/slide8.xml><?xml version="1.0" encoding="utf-8"?>
 <p:sld xmlns:a="http://schemas.openxmlformats.org/drawingml/2006/main" xmlns:r="http://schemas.openxmlformats.org/officeDocument/2006/relationships" xmlns:p="http://schemas.openxmlformats.org/presentationml/2006/main">
   <p:cSld>
     <p:spTree>
@@ -4924,7 +5263,7 @@
 </p:sld>
 </file>
 
-<file path=ppt/slides/slide8.xml><?xml version="1.0" encoding="utf-8"?>
+<file path=ppt/slides/slide9.xml><?xml version="1.0" encoding="utf-8"?>
 <p:sld xmlns:a="http://schemas.openxmlformats.org/drawingml/2006/main" xmlns:r="http://schemas.openxmlformats.org/officeDocument/2006/relationships" xmlns:p="http://schemas.openxmlformats.org/presentationml/2006/main">
   <p:cSld>
     <p:spTree>
@@ -6013,6 +6352,12 @@
 </file>
 
 <file path=customXml/item2.xml><?xml version="1.0" encoding="utf-8"?>
+<p:properties xmlns:p="http://schemas.microsoft.com/office/2006/metadata/properties" xmlns:xsi="http://www.w3.org/2001/XMLSchema-instance" xmlns:pc="http://schemas.microsoft.com/office/infopath/2007/PartnerControls">
+  <documentManagement/>
+</p:properties>
+</file>
+
+<file path=customXml/item3.xml><?xml version="1.0" encoding="utf-8"?>
 <ct:contentTypeSchema xmlns:ct="http://schemas.microsoft.com/office/2006/metadata/contentType" xmlns:ma="http://schemas.microsoft.com/office/2006/metadata/properties/metaAttributes" ct:_="" ma:_="" ma:contentTypeName="Document" ma:contentTypeID="0x010100693156C96291C349BBF8B640319D465D" ma:contentTypeVersion="0" ma:contentTypeDescription="Create a new document." ma:contentTypeScope="" ma:versionID="8a71be8d30b42e8e74cf70a4a4cbda4c">
   <xsd:schema xmlns:xsd="http://www.w3.org/2001/XMLSchema" xmlns:p="http://schemas.microsoft.com/office/2006/metadata/properties" targetNamespace="http://schemas.microsoft.com/office/2006/metadata/properties" ma:root="true" ma:fieldsID="4aeb20c0e3442673af7ee10786458764">
     <xsd:element name="properties">
@@ -6061,12 +6406,6 @@
 </ct:contentTypeSchema>
 </file>
 
-<file path=customXml/item3.xml><?xml version="1.0" encoding="utf-8"?>
-<p:properties xmlns:p="http://schemas.microsoft.com/office/2006/metadata/properties" xmlns:xsi="http://www.w3.org/2001/XMLSchema-instance" xmlns:pc="http://schemas.microsoft.com/office/infopath/2007/PartnerControls">
-  <documentManagement/>
-</p:properties>
-</file>
-
 <file path=customXml/itemProps1.xml><?xml version="1.0" encoding="utf-8"?>
 <ds:datastoreItem xmlns:ds="http://schemas.openxmlformats.org/officeDocument/2006/customXml" ds:itemID="{19E20559-B232-4371-8690-E3D8007EDB82}">
   <ds:schemaRefs>
@@ -6076,6 +6415,21 @@
 </file>
 
 <file path=customXml/itemProps2.xml><?xml version="1.0" encoding="utf-8"?>
+<ds:datastoreItem xmlns:ds="http://schemas.openxmlformats.org/officeDocument/2006/customXml" ds:itemID="{A50EC660-24D0-43A0-AE5E-E274115E726B}">
+  <ds:schemaRefs>
+    <ds:schemaRef ds:uri="http://purl.org/dc/dcmitype/"/>
+    <ds:schemaRef ds:uri="http://schemas.microsoft.com/office/2006/metadata/properties"/>
+    <ds:schemaRef ds:uri="http://purl.org/dc/elements/1.1/"/>
+    <ds:schemaRef ds:uri="http://schemas.microsoft.com/office/2006/documentManagement/types"/>
+    <ds:schemaRef ds:uri="http://schemas.openxmlformats.org/package/2006/metadata/core-properties"/>
+    <ds:schemaRef ds:uri="http://www.w3.org/XML/1998/namespace"/>
+    <ds:schemaRef ds:uri="http://purl.org/dc/terms/"/>
+    <ds:schemaRef ds:uri="http://schemas.microsoft.com/office/infopath/2007/PartnerControls"/>
+  </ds:schemaRefs>
+</ds:datastoreItem>
+</file>
+
+<file path=customXml/itemProps3.xml><?xml version="1.0" encoding="utf-8"?>
 <ds:datastoreItem xmlns:ds="http://schemas.openxmlformats.org/officeDocument/2006/customXml" ds:itemID="{D85F602D-FF92-4BDD-B4C2-093468CCF754}">
   <ds:schemaRefs>
     <ds:schemaRef ds:uri="http://schemas.microsoft.com/office/2006/metadata/contentType"/>
@@ -6088,19 +6442,4 @@
     <ds:schemaRef ds:uri="http://schemas.microsoft.com/office/internal/2005/internalDocumentation"/>
   </ds:schemaRefs>
 </ds:datastoreItem>
-</file>
-
-<file path=customXml/itemProps3.xml><?xml version="1.0" encoding="utf-8"?>
-<ds:datastoreItem xmlns:ds="http://schemas.openxmlformats.org/officeDocument/2006/customXml" ds:itemID="{A50EC660-24D0-43A0-AE5E-E274115E726B}">
-  <ds:schemaRefs>
-    <ds:schemaRef ds:uri="http://purl.org/dc/dcmitype/"/>
-    <ds:schemaRef ds:uri="http://schemas.microsoft.com/office/2006/metadata/properties"/>
-    <ds:schemaRef ds:uri="http://purl.org/dc/elements/1.1/"/>
-    <ds:schemaRef ds:uri="http://schemas.microsoft.com/office/2006/documentManagement/types"/>
-    <ds:schemaRef ds:uri="http://schemas.openxmlformats.org/package/2006/metadata/core-properties"/>
-    <ds:schemaRef ds:uri="http://www.w3.org/XML/1998/namespace"/>
-    <ds:schemaRef ds:uri="http://purl.org/dc/terms/"/>
-    <ds:schemaRef ds:uri="http://schemas.microsoft.com/office/infopath/2007/PartnerControls"/>
-  </ds:schemaRefs>
-</ds:datastoreItem>
 </file>
</xml_diff>

<commit_message>
Add Richard to team
</commit_message>
<xml_diff>
--- a/2020/ECP/slides/01-Overview.pptx
+++ b/2020/ECP/slides/01-Overview.pptx
@@ -4662,6 +4662,13 @@
             <a:pPr lvl="1"/>
             <a:r>
               <a:rPr lang="en-US" sz="2000" dirty="0"/>
+              <a:t>Richard Turgeon</a:t>
+            </a:r>
+          </a:p>
+          <a:p>
+            <a:pPr lvl="1"/>
+            <a:r>
+              <a:rPr lang="en-US" sz="2000" dirty="0"/>
               <a:t>Justin Wozniak</a:t>
             </a:r>
           </a:p>
@@ -4690,12 +4697,6 @@
               <a:rPr lang="en-US" sz="2000" dirty="0"/>
               <a:t>…</a:t>
             </a:r>
-          </a:p>
-          <a:p>
-            <a:pPr marL="0" indent="0">
-              <a:buNone/>
-            </a:pPr>
-            <a:endParaRPr lang="en-US" sz="2000" dirty="0"/>
           </a:p>
           <a:p>
             <a:r>
@@ -6728,6 +6729,21 @@
 </file>
 
 <file path=customXml/item1.xml><?xml version="1.0" encoding="utf-8"?>
+<?mso-contentType ?>
+<FormTemplates xmlns="http://schemas.microsoft.com/sharepoint/v3/contenttype/forms">
+  <Display>DocumentLibraryForm</Display>
+  <Edit>DocumentLibraryForm</Edit>
+  <New>DocumentLibraryForm</New>
+</FormTemplates>
+</file>
+
+<file path=customXml/item2.xml><?xml version="1.0" encoding="utf-8"?>
+<p:properties xmlns:p="http://schemas.microsoft.com/office/2006/metadata/properties" xmlns:xsi="http://www.w3.org/2001/XMLSchema-instance" xmlns:pc="http://schemas.microsoft.com/office/infopath/2007/PartnerControls">
+  <documentManagement/>
+</p:properties>
+</file>
+
+<file path=customXml/item3.xml><?xml version="1.0" encoding="utf-8"?>
 <ct:contentTypeSchema xmlns:ct="http://schemas.microsoft.com/office/2006/metadata/contentType" xmlns:ma="http://schemas.microsoft.com/office/2006/metadata/properties/metaAttributes" ct:_="" ma:_="" ma:contentTypeName="Document" ma:contentTypeID="0x010100693156C96291C349BBF8B640319D465D" ma:contentTypeVersion="0" ma:contentTypeDescription="Create a new document." ma:contentTypeScope="" ma:versionID="8a71be8d30b42e8e74cf70a4a4cbda4c">
   <xsd:schema xmlns:xsd="http://www.w3.org/2001/XMLSchema" xmlns:p="http://schemas.microsoft.com/office/2006/metadata/properties" targetNamespace="http://schemas.microsoft.com/office/2006/metadata/properties" ma:root="true" ma:fieldsID="4aeb20c0e3442673af7ee10786458764">
     <xsd:element name="properties">
@@ -6776,32 +6792,10 @@
 </ct:contentTypeSchema>
 </file>
 
-<file path=customXml/item2.xml><?xml version="1.0" encoding="utf-8"?>
-<p:properties xmlns:p="http://schemas.microsoft.com/office/2006/metadata/properties" xmlns:xsi="http://www.w3.org/2001/XMLSchema-instance" xmlns:pc="http://schemas.microsoft.com/office/infopath/2007/PartnerControls">
-  <documentManagement/>
-</p:properties>
-</file>
-
-<file path=customXml/item3.xml><?xml version="1.0" encoding="utf-8"?>
-<?mso-contentType ?>
-<FormTemplates xmlns="http://schemas.microsoft.com/sharepoint/v3/contenttype/forms">
-  <Display>DocumentLibraryForm</Display>
-  <Edit>DocumentLibraryForm</Edit>
-  <New>DocumentLibraryForm</New>
-</FormTemplates>
-</file>
-
 <file path=customXml/itemProps1.xml><?xml version="1.0" encoding="utf-8"?>
-<ds:datastoreItem xmlns:ds="http://schemas.openxmlformats.org/officeDocument/2006/customXml" ds:itemID="{D85F602D-FF92-4BDD-B4C2-093468CCF754}">
+<ds:datastoreItem xmlns:ds="http://schemas.openxmlformats.org/officeDocument/2006/customXml" ds:itemID="{19E20559-B232-4371-8690-E3D8007EDB82}">
   <ds:schemaRefs>
-    <ds:schemaRef ds:uri="http://schemas.microsoft.com/office/2006/metadata/contentType"/>
-    <ds:schemaRef ds:uri="http://schemas.microsoft.com/office/2006/metadata/properties/metaAttributes"/>
-    <ds:schemaRef ds:uri="http://www.w3.org/2001/XMLSchema"/>
-    <ds:schemaRef ds:uri="http://schemas.microsoft.com/office/2006/metadata/properties"/>
-    <ds:schemaRef ds:uri="http://schemas.openxmlformats.org/package/2006/metadata/core-properties"/>
-    <ds:schemaRef ds:uri="http://purl.org/dc/elements/1.1/"/>
-    <ds:schemaRef ds:uri="http://purl.org/dc/terms/"/>
-    <ds:schemaRef ds:uri="http://schemas.microsoft.com/office/internal/2005/internalDocumentation"/>
+    <ds:schemaRef ds:uri="http://schemas.microsoft.com/sharepoint/v3/contenttype/forms"/>
   </ds:schemaRefs>
 </ds:datastoreItem>
 </file>
@@ -6822,9 +6816,16 @@
 </file>
 
 <file path=customXml/itemProps3.xml><?xml version="1.0" encoding="utf-8"?>
-<ds:datastoreItem xmlns:ds="http://schemas.openxmlformats.org/officeDocument/2006/customXml" ds:itemID="{19E20559-B232-4371-8690-E3D8007EDB82}">
+<ds:datastoreItem xmlns:ds="http://schemas.openxmlformats.org/officeDocument/2006/customXml" ds:itemID="{D85F602D-FF92-4BDD-B4C2-093468CCF754}">
   <ds:schemaRefs>
-    <ds:schemaRef ds:uri="http://schemas.microsoft.com/sharepoint/v3/contenttype/forms"/>
+    <ds:schemaRef ds:uri="http://schemas.microsoft.com/office/2006/metadata/contentType"/>
+    <ds:schemaRef ds:uri="http://schemas.microsoft.com/office/2006/metadata/properties/metaAttributes"/>
+    <ds:schemaRef ds:uri="http://www.w3.org/2001/XMLSchema"/>
+    <ds:schemaRef ds:uri="http://schemas.microsoft.com/office/2006/metadata/properties"/>
+    <ds:schemaRef ds:uri="http://schemas.openxmlformats.org/package/2006/metadata/core-properties"/>
+    <ds:schemaRef ds:uri="http://purl.org/dc/elements/1.1/"/>
+    <ds:schemaRef ds:uri="http://purl.org/dc/terms/"/>
+    <ds:schemaRef ds:uri="http://schemas.microsoft.com/office/internal/2005/internalDocumentation"/>
   </ds:schemaRefs>
 </ds:datastoreItem>
 </file>
</xml_diff>